<commit_message>
removed phone form request
</commit_message>
<xml_diff>
--- a/design/CS343 - P1 Sketch Up.pptx
+++ b/design/CS343 - P1 Sketch Up.pptx
@@ -5138,8 +5138,8 @@
         </p:nvSpPr>
         <p:spPr>
           <a:xfrm>
-            <a:off x="6334125" y="3228074"/>
-            <a:ext cx="3756028" cy="1323439"/>
+            <a:off x="6096000" y="2974874"/>
+            <a:ext cx="3756028" cy="830997"/>
           </a:xfrm>
           <a:prstGeom prst="rect">
             <a:avLst/>
@@ -5194,44 +5194,18 @@
           </a:p>
           <a:p>
             <a:r>
+              <a:rPr lang="en-US" sz="1600">
+                <a:latin typeface="Arial" panose="020B0604020202020204" pitchFamily="34" charset="0"/>
+                <a:cs typeface="Arial" panose="020B0604020202020204" pitchFamily="34" charset="0"/>
+              </a:rPr>
+              <a:t>(Submit</a:t>
+            </a:r>
+            <a:r>
               <a:rPr lang="en-US" sz="1600" dirty="0">
                 <a:latin typeface="Arial" panose="020B0604020202020204" pitchFamily="34" charset="0"/>
                 <a:cs typeface="Arial" panose="020B0604020202020204" pitchFamily="34" charset="0"/>
               </a:rPr>
-              <a:t>Phone Number: </a:t>
-            </a:r>
-            <a:r>
-              <a:rPr lang="en-US" sz="1600" u="sng" dirty="0">
-                <a:latin typeface="Arial" panose="020B0604020202020204" pitchFamily="34" charset="0"/>
-                <a:cs typeface="Arial" panose="020B0604020202020204" pitchFamily="34" charset="0"/>
-              </a:rPr>
-              <a:t>(xxx)-xxx-</a:t>
-            </a:r>
-            <a:r>
-              <a:rPr lang="en-US" sz="1600" u="sng" dirty="0" err="1">
-                <a:latin typeface="Arial" panose="020B0604020202020204" pitchFamily="34" charset="0"/>
-                <a:cs typeface="Arial" panose="020B0604020202020204" pitchFamily="34" charset="0"/>
-              </a:rPr>
-              <a:t>xxxx</a:t>
-            </a:r>
-            <a:endParaRPr lang="en-US" sz="1600" dirty="0">
-              <a:latin typeface="Arial" panose="020B0604020202020204" pitchFamily="34" charset="0"/>
-              <a:cs typeface="Arial" panose="020B0604020202020204" pitchFamily="34" charset="0"/>
-            </a:endParaRPr>
-          </a:p>
-          <a:p>
-            <a:endParaRPr lang="en-US" sz="1600" dirty="0">
-              <a:latin typeface="Arial" panose="020B0604020202020204" pitchFamily="34" charset="0"/>
-              <a:cs typeface="Arial" panose="020B0604020202020204" pitchFamily="34" charset="0"/>
-            </a:endParaRPr>
-          </a:p>
-          <a:p>
-            <a:r>
-              <a:rPr lang="en-US" sz="1600" dirty="0">
-                <a:latin typeface="Arial" panose="020B0604020202020204" pitchFamily="34" charset="0"/>
-                <a:cs typeface="Arial" panose="020B0604020202020204" pitchFamily="34" charset="0"/>
-              </a:rPr>
-              <a:t>(This will be an HTML Form)</a:t>
+              <a:t>)</a:t>
             </a:r>
           </a:p>
         </p:txBody>

</xml_diff>